<commit_message>
created .net workshop 'todo' code for part 2 and updated slides to indicate TODO
</commit_message>
<xml_diff>
--- a/connect2016/developer/02/02.pptx
+++ b/connect2016/developer/02/02.pptx
@@ -275,7 +275,7 @@
           <a:p>
             <a:fld id="{B5389E1E-C654-E943-9883-792E99AD7287}" type="datetimeFigureOut">
               <a:rPr lang="en-US" smtClean="0"/>
-              <a:t>10/24/2016</a:t>
+              <a:t>10/25/2016</a:t>
             </a:fld>
             <a:endParaRPr lang="en-US"/>
           </a:p>
@@ -441,7 +441,7 @@
           <a:p>
             <a:fld id="{9920D99B-2862-464A-984E-65BFC5FC0BBC}" type="datetimeFigureOut">
               <a:rPr lang="en-US" smtClean="0"/>
-              <a:t>10/24/2016</a:t>
+              <a:t>10/25/2016</a:t>
             </a:fld>
             <a:endParaRPr lang="en-US"/>
           </a:p>
@@ -7903,6 +7903,28 @@
               <a:rPr lang="en-US" dirty="0"/>
               <a:t>Select documents with N1QL</a:t>
             </a:r>
+          </a:p>
+          <a:p>
+            <a:pPr marL="342900" indent="-342900">
+              <a:buFont typeface="Arial" charset="0"/>
+              <a:buChar char="•"/>
+            </a:pPr>
+            <a:endParaRPr lang="en-US" dirty="0"/>
+          </a:p>
+          <a:p>
+            <a:pPr marL="342900" indent="-342900">
+              <a:buFont typeface="Arial" charset="0"/>
+              <a:buChar char="•"/>
+            </a:pPr>
+            <a:r>
+              <a:rPr lang="en-US" dirty="0"/>
+              <a:t>Fill in </a:t>
+            </a:r>
+            <a:r>
+              <a:rPr lang="en-US"/>
+              <a:t>the blanks: look for “TODO”</a:t>
+            </a:r>
+            <a:endParaRPr lang="en-US" dirty="0"/>
           </a:p>
           <a:p>
             <a:endParaRPr lang="en-US" dirty="0"/>

</xml_diff>